<commit_message>
add commit in git.pptx
</commit_message>
<xml_diff>
--- a/doc/ppt/git.pptx
+++ b/doc/ppt/git.pptx
@@ -18,6 +18,10 @@
     <p:sldId id="266" r:id="rId12"/>
     <p:sldId id="267" r:id="rId13"/>
     <p:sldId id="268" r:id="rId14"/>
+    <p:sldId id="269" r:id="rId15"/>
+    <p:sldId id="270" r:id="rId16"/>
+    <p:sldId id="271" r:id="rId17"/>
+    <p:sldId id="272" r:id="rId18"/>
   </p:sldIdLst>
   <p:sldSz cx="12192000" cy="6858000"/>
   <p:notesSz cx="6858000" cy="9144000"/>
@@ -3983,6 +3987,1031 @@
 </p:sld>
 </file>
 
+<file path=ppt/slides/slide14.xml><?xml version="1.0" encoding="utf-8"?>
+<p:sld xmlns:a="http://schemas.openxmlformats.org/drawingml/2006/main" xmlns:r="http://schemas.openxmlformats.org/officeDocument/2006/relationships" xmlns:p="http://schemas.openxmlformats.org/presentationml/2006/main">
+  <p:cSld>
+    <p:spTree>
+      <p:nvGrpSpPr>
+        <p:cNvPr id="1" name=""/>
+        <p:cNvGrpSpPr/>
+        <p:nvPr/>
+      </p:nvGrpSpPr>
+      <p:grpSpPr>
+        <a:xfrm>
+          <a:off x="0" y="0"/>
+          <a:ext cx="0" cy="0"/>
+          <a:chOff x="0" y="0"/>
+          <a:chExt cx="0" cy="0"/>
+        </a:xfrm>
+      </p:grpSpPr>
+      <p:sp>
+        <p:nvSpPr>
+          <p:cNvPr id="2" name="标题 1"/>
+          <p:cNvSpPr>
+            <a:spLocks noGrp="1"/>
+          </p:cNvSpPr>
+          <p:nvPr>
+            <p:ph type="ctrTitle"/>
+          </p:nvPr>
+        </p:nvSpPr>
+        <p:spPr>
+          <a:xfrm>
+            <a:off x="373626" y="309716"/>
+            <a:ext cx="7590503" cy="840658"/>
+          </a:xfrm>
+        </p:spPr>
+        <p:txBody>
+          <a:bodyPr>
+            <a:normAutofit/>
+          </a:bodyPr>
+          <a:lstStyle/>
+          <a:p>
+            <a:pPr algn="l"/>
+            <a:r>
+              <a:rPr lang="zh-CN" altLang="en-US" sz="5400" dirty="0"/>
+              <a:t>创建版本库</a:t>
+            </a:r>
+          </a:p>
+        </p:txBody>
+      </p:sp>
+      <p:sp>
+        <p:nvSpPr>
+          <p:cNvPr id="3" name="副标题 2"/>
+          <p:cNvSpPr>
+            <a:spLocks noGrp="1"/>
+          </p:cNvSpPr>
+          <p:nvPr>
+            <p:ph type="subTitle" idx="1"/>
+          </p:nvPr>
+        </p:nvSpPr>
+        <p:spPr>
+          <a:xfrm>
+            <a:off x="373626" y="1356851"/>
+            <a:ext cx="11336593" cy="1354803"/>
+          </a:xfrm>
+        </p:spPr>
+        <p:txBody>
+          <a:bodyPr>
+            <a:noAutofit/>
+          </a:bodyPr>
+          <a:lstStyle/>
+          <a:p>
+            <a:pPr algn="l">
+              <a:lnSpc>
+                <a:spcPct val="150000"/>
+              </a:lnSpc>
+            </a:pPr>
+            <a:r>
+              <a:rPr lang="zh-CN" altLang="en-US" sz="1600" dirty="0"/>
+              <a:t>什么是版本库呢？版本库又名仓库，英文名</a:t>
+            </a:r>
+            <a:r>
+              <a:rPr lang="en-US" altLang="zh-CN" sz="1600" b="1" dirty="0"/>
+              <a:t>repository</a:t>
+            </a:r>
+            <a:r>
+              <a:rPr lang="zh-CN" altLang="en-US" sz="1600" dirty="0"/>
+              <a:t>，你可以简单理解成一个目录，这个目录里面的所有文件都可以被</a:t>
+            </a:r>
+            <a:r>
+              <a:rPr lang="en-US" altLang="zh-CN" sz="1600" dirty="0" err="1"/>
+              <a:t>Git</a:t>
+            </a:r>
+            <a:r>
+              <a:rPr lang="zh-CN" altLang="en-US" sz="1600" dirty="0"/>
+              <a:t>管理起来，每个文件的修改、删除，</a:t>
+            </a:r>
+            <a:r>
+              <a:rPr lang="en-US" altLang="zh-CN" sz="1600" dirty="0" err="1"/>
+              <a:t>Git</a:t>
+            </a:r>
+            <a:r>
+              <a:rPr lang="zh-CN" altLang="en-US" sz="1600" dirty="0"/>
+              <a:t>都能跟踪，以便任何时刻都可以追踪历史，或者在将来某个时刻可以“还原”。</a:t>
+            </a:r>
+          </a:p>
+          <a:p>
+            <a:pPr algn="l">
+              <a:lnSpc>
+                <a:spcPct val="150000"/>
+              </a:lnSpc>
+            </a:pPr>
+            <a:r>
+              <a:rPr lang="zh-CN" altLang="en-US" sz="1600" dirty="0"/>
+              <a:t>所以，创建一个版本库非常简单，首先，选择一个合适的地方，创建一个空目录：</a:t>
+            </a:r>
+          </a:p>
+        </p:txBody>
+      </p:sp>
+      <p:pic>
+        <p:nvPicPr>
+          <p:cNvPr id="4" name="图片 3"/>
+          <p:cNvPicPr>
+            <a:picLocks noChangeAspect="1"/>
+          </p:cNvPicPr>
+          <p:nvPr/>
+        </p:nvPicPr>
+        <p:blipFill>
+          <a:blip r:embed="rId2"/>
+          <a:stretch>
+            <a:fillRect/>
+          </a:stretch>
+        </p:blipFill>
+        <p:spPr>
+          <a:xfrm>
+            <a:off x="417870" y="2711654"/>
+            <a:ext cx="2971800" cy="1346200"/>
+          </a:xfrm>
+          <a:prstGeom prst="rect">
+            <a:avLst/>
+          </a:prstGeom>
+        </p:spPr>
+      </p:pic>
+      <p:sp>
+        <p:nvSpPr>
+          <p:cNvPr id="5" name="副标题 2"/>
+          <p:cNvSpPr txBox="1">
+            <a:spLocks/>
+          </p:cNvSpPr>
+          <p:nvPr/>
+        </p:nvSpPr>
+        <p:spPr>
+          <a:xfrm>
+            <a:off x="309716" y="4184445"/>
+            <a:ext cx="11336593" cy="1354803"/>
+          </a:xfrm>
+          <a:prstGeom prst="rect">
+            <a:avLst/>
+          </a:prstGeom>
+        </p:spPr>
+        <p:txBody>
+          <a:bodyPr vert="horz" lIns="91440" tIns="45720" rIns="91440" bIns="45720" rtlCol="0">
+            <a:noAutofit/>
+          </a:bodyPr>
+          <a:lstStyle>
+            <a:lvl1pPr marL="0" indent="0" algn="ctr" defTabSz="914400" rtl="0" eaLnBrk="1" latinLnBrk="0" hangingPunct="1">
+              <a:lnSpc>
+                <a:spcPct val="90000"/>
+              </a:lnSpc>
+              <a:spcBef>
+                <a:spcPts val="1000"/>
+              </a:spcBef>
+              <a:buFont typeface="Arial"/>
+              <a:buNone/>
+              <a:defRPr sz="2400" kern="1200">
+                <a:solidFill>
+                  <a:schemeClr val="tx1"/>
+                </a:solidFill>
+                <a:latin typeface="+mn-lt"/>
+                <a:ea typeface="+mn-ea"/>
+                <a:cs typeface="+mn-cs"/>
+              </a:defRPr>
+            </a:lvl1pPr>
+            <a:lvl2pPr marL="457200" indent="0" algn="ctr" defTabSz="914400" rtl="0" eaLnBrk="1" latinLnBrk="0" hangingPunct="1">
+              <a:lnSpc>
+                <a:spcPct val="90000"/>
+              </a:lnSpc>
+              <a:spcBef>
+                <a:spcPts val="500"/>
+              </a:spcBef>
+              <a:buFont typeface="Arial"/>
+              <a:buNone/>
+              <a:defRPr sz="2000" kern="1200">
+                <a:solidFill>
+                  <a:schemeClr val="tx1"/>
+                </a:solidFill>
+                <a:latin typeface="+mn-lt"/>
+                <a:ea typeface="+mn-ea"/>
+                <a:cs typeface="+mn-cs"/>
+              </a:defRPr>
+            </a:lvl2pPr>
+            <a:lvl3pPr marL="914400" indent="0" algn="ctr" defTabSz="914400" rtl="0" eaLnBrk="1" latinLnBrk="0" hangingPunct="1">
+              <a:lnSpc>
+                <a:spcPct val="90000"/>
+              </a:lnSpc>
+              <a:spcBef>
+                <a:spcPts val="500"/>
+              </a:spcBef>
+              <a:buFont typeface="Arial"/>
+              <a:buNone/>
+              <a:defRPr sz="1800" kern="1200">
+                <a:solidFill>
+                  <a:schemeClr val="tx1"/>
+                </a:solidFill>
+                <a:latin typeface="+mn-lt"/>
+                <a:ea typeface="+mn-ea"/>
+                <a:cs typeface="+mn-cs"/>
+              </a:defRPr>
+            </a:lvl3pPr>
+            <a:lvl4pPr marL="1371600" indent="0" algn="ctr" defTabSz="914400" rtl="0" eaLnBrk="1" latinLnBrk="0" hangingPunct="1">
+              <a:lnSpc>
+                <a:spcPct val="90000"/>
+              </a:lnSpc>
+              <a:spcBef>
+                <a:spcPts val="500"/>
+              </a:spcBef>
+              <a:buFont typeface="Arial"/>
+              <a:buNone/>
+              <a:defRPr sz="1600" kern="1200">
+                <a:solidFill>
+                  <a:schemeClr val="tx1"/>
+                </a:solidFill>
+                <a:latin typeface="+mn-lt"/>
+                <a:ea typeface="+mn-ea"/>
+                <a:cs typeface="+mn-cs"/>
+              </a:defRPr>
+            </a:lvl4pPr>
+            <a:lvl5pPr marL="1828800" indent="0" algn="ctr" defTabSz="914400" rtl="0" eaLnBrk="1" latinLnBrk="0" hangingPunct="1">
+              <a:lnSpc>
+                <a:spcPct val="90000"/>
+              </a:lnSpc>
+              <a:spcBef>
+                <a:spcPts val="500"/>
+              </a:spcBef>
+              <a:buFont typeface="Arial"/>
+              <a:buNone/>
+              <a:defRPr sz="1600" kern="1200">
+                <a:solidFill>
+                  <a:schemeClr val="tx1"/>
+                </a:solidFill>
+                <a:latin typeface="+mn-lt"/>
+                <a:ea typeface="+mn-ea"/>
+                <a:cs typeface="+mn-cs"/>
+              </a:defRPr>
+            </a:lvl5pPr>
+            <a:lvl6pPr marL="2286000" indent="0" algn="ctr" defTabSz="914400" rtl="0" eaLnBrk="1" latinLnBrk="0" hangingPunct="1">
+              <a:lnSpc>
+                <a:spcPct val="90000"/>
+              </a:lnSpc>
+              <a:spcBef>
+                <a:spcPts val="500"/>
+              </a:spcBef>
+              <a:buFont typeface="Arial"/>
+              <a:buNone/>
+              <a:defRPr sz="1600" kern="1200">
+                <a:solidFill>
+                  <a:schemeClr val="tx1"/>
+                </a:solidFill>
+                <a:latin typeface="+mn-lt"/>
+                <a:ea typeface="+mn-ea"/>
+                <a:cs typeface="+mn-cs"/>
+              </a:defRPr>
+            </a:lvl6pPr>
+            <a:lvl7pPr marL="2743200" indent="0" algn="ctr" defTabSz="914400" rtl="0" eaLnBrk="1" latinLnBrk="0" hangingPunct="1">
+              <a:lnSpc>
+                <a:spcPct val="90000"/>
+              </a:lnSpc>
+              <a:spcBef>
+                <a:spcPts val="500"/>
+              </a:spcBef>
+              <a:buFont typeface="Arial"/>
+              <a:buNone/>
+              <a:defRPr sz="1600" kern="1200">
+                <a:solidFill>
+                  <a:schemeClr val="tx1"/>
+                </a:solidFill>
+                <a:latin typeface="+mn-lt"/>
+                <a:ea typeface="+mn-ea"/>
+                <a:cs typeface="+mn-cs"/>
+              </a:defRPr>
+            </a:lvl7pPr>
+            <a:lvl8pPr marL="3200400" indent="0" algn="ctr" defTabSz="914400" rtl="0" eaLnBrk="1" latinLnBrk="0" hangingPunct="1">
+              <a:lnSpc>
+                <a:spcPct val="90000"/>
+              </a:lnSpc>
+              <a:spcBef>
+                <a:spcPts val="500"/>
+              </a:spcBef>
+              <a:buFont typeface="Arial"/>
+              <a:buNone/>
+              <a:defRPr sz="1600" kern="1200">
+                <a:solidFill>
+                  <a:schemeClr val="tx1"/>
+                </a:solidFill>
+                <a:latin typeface="+mn-lt"/>
+                <a:ea typeface="+mn-ea"/>
+                <a:cs typeface="+mn-cs"/>
+              </a:defRPr>
+            </a:lvl8pPr>
+            <a:lvl9pPr marL="3657600" indent="0" algn="ctr" defTabSz="914400" rtl="0" eaLnBrk="1" latinLnBrk="0" hangingPunct="1">
+              <a:lnSpc>
+                <a:spcPct val="90000"/>
+              </a:lnSpc>
+              <a:spcBef>
+                <a:spcPts val="500"/>
+              </a:spcBef>
+              <a:buFont typeface="Arial"/>
+              <a:buNone/>
+              <a:defRPr sz="1600" kern="1200">
+                <a:solidFill>
+                  <a:schemeClr val="tx1"/>
+                </a:solidFill>
+                <a:latin typeface="+mn-lt"/>
+                <a:ea typeface="+mn-ea"/>
+                <a:cs typeface="+mn-cs"/>
+              </a:defRPr>
+            </a:lvl9pPr>
+          </a:lstStyle>
+          <a:p>
+            <a:pPr algn="l"/>
+            <a:r>
+              <a:rPr lang="en-US" altLang="zh-CN" sz="1600" dirty="0" err="1"/>
+              <a:t>pwd</a:t>
+            </a:r>
+            <a:r>
+              <a:rPr lang="zh-CN" altLang="en-US" sz="1600" dirty="0"/>
+              <a:t>命令用于显示当前目录</a:t>
+            </a:r>
+            <a:r>
+              <a:rPr lang="zh-CN" altLang="en-US" sz="1600" dirty="0" smtClean="0"/>
+              <a:t>。</a:t>
+            </a:r>
+            <a:r>
+              <a:rPr lang="zh-CN" altLang="en-US" sz="1600" dirty="0" smtClean="0"/>
+              <a:t>现在</a:t>
+            </a:r>
+            <a:r>
+              <a:rPr lang="zh-CN" altLang="en-US" sz="1600" dirty="0" smtClean="0"/>
+              <a:t>这个</a:t>
+            </a:r>
+            <a:r>
+              <a:rPr lang="zh-CN" altLang="en-US" sz="1600" dirty="0"/>
+              <a:t>仓库</a:t>
+            </a:r>
+            <a:r>
+              <a:rPr lang="zh-CN" altLang="en-US" sz="1600" dirty="0" smtClean="0"/>
+              <a:t>位于</a:t>
+            </a:r>
+            <a:r>
+              <a:rPr lang="en-US" altLang="zh-CN" sz="1600" dirty="0" smtClean="0"/>
+              <a:t>/Users/</a:t>
+            </a:r>
+            <a:r>
+              <a:rPr lang="en-US" altLang="zh-CN" sz="1600" dirty="0" err="1" smtClean="0"/>
+              <a:t>noprom</a:t>
+            </a:r>
+            <a:r>
+              <a:rPr lang="en-US" altLang="zh-CN" sz="1600" dirty="0" smtClean="0"/>
+              <a:t>/Desktop/</a:t>
+            </a:r>
+            <a:r>
+              <a:rPr lang="en-US" altLang="zh-CN" sz="1600" dirty="0" err="1" smtClean="0"/>
+              <a:t>learngit</a:t>
+            </a:r>
+            <a:endParaRPr lang="en-US" altLang="zh-CN" sz="1600" dirty="0" smtClean="0"/>
+          </a:p>
+          <a:p>
+            <a:pPr algn="l"/>
+            <a:r>
+              <a:rPr lang="zh-CN" altLang="en-US" sz="1600" dirty="0" smtClean="0"/>
+              <a:t>如果</a:t>
+            </a:r>
+            <a:r>
+              <a:rPr lang="zh-CN" altLang="en-US" sz="1600" dirty="0"/>
+              <a:t>你使用</a:t>
+            </a:r>
+            <a:r>
+              <a:rPr lang="en-US" altLang="zh-CN" sz="1600" dirty="0"/>
+              <a:t>Windows</a:t>
+            </a:r>
+            <a:r>
+              <a:rPr lang="zh-CN" altLang="en-US" sz="1600" dirty="0"/>
+              <a:t>系统，为了避免遇到各种莫名其妙的问题，请确保目录名（包括父目录）不包含中文。</a:t>
+            </a:r>
+          </a:p>
+          <a:p>
+            <a:pPr algn="l"/>
+            <a:r>
+              <a:rPr lang="zh-CN" altLang="en-US" sz="1600" dirty="0"/>
+              <a:t>第二步，通过</a:t>
+            </a:r>
+            <a:r>
+              <a:rPr lang="en-US" altLang="zh-CN" sz="1600" dirty="0" err="1"/>
+              <a:t>git</a:t>
+            </a:r>
+            <a:r>
+              <a:rPr lang="en-US" altLang="zh-CN" sz="1600" dirty="0"/>
+              <a:t> </a:t>
+            </a:r>
+            <a:r>
+              <a:rPr lang="en-US" altLang="zh-CN" sz="1600" dirty="0" err="1"/>
+              <a:t>init</a:t>
+            </a:r>
+            <a:r>
+              <a:rPr lang="zh-CN" altLang="en-US" sz="1600" dirty="0"/>
+              <a:t>命令把这个目录变成</a:t>
+            </a:r>
+            <a:r>
+              <a:rPr lang="en-US" altLang="zh-CN" sz="1600" dirty="0" err="1"/>
+              <a:t>Git</a:t>
+            </a:r>
+            <a:r>
+              <a:rPr lang="zh-CN" altLang="en-US" sz="1600" dirty="0"/>
+              <a:t>可以管理的仓库：</a:t>
+            </a:r>
+          </a:p>
+        </p:txBody>
+      </p:sp>
+      <p:pic>
+        <p:nvPicPr>
+          <p:cNvPr id="6" name="图片 5"/>
+          <p:cNvPicPr>
+            <a:picLocks noChangeAspect="1"/>
+          </p:cNvPicPr>
+          <p:nvPr/>
+        </p:nvPicPr>
+        <p:blipFill>
+          <a:blip r:embed="rId3"/>
+          <a:stretch>
+            <a:fillRect/>
+          </a:stretch>
+        </p:blipFill>
+        <p:spPr>
+          <a:xfrm>
+            <a:off x="417870" y="5316792"/>
+            <a:ext cx="6553200" cy="698500"/>
+          </a:xfrm>
+          <a:prstGeom prst="rect">
+            <a:avLst/>
+          </a:prstGeom>
+        </p:spPr>
+      </p:pic>
+    </p:spTree>
+    <p:extLst>
+      <p:ext uri="{BB962C8B-B14F-4D97-AF65-F5344CB8AC3E}">
+        <p14:creationId xmlns:p14="http://schemas.microsoft.com/office/powerpoint/2010/main" val="780821396"/>
+      </p:ext>
+    </p:extLst>
+  </p:cSld>
+  <p:clrMapOvr>
+    <a:masterClrMapping/>
+  </p:clrMapOvr>
+</p:sld>
+</file>
+
+<file path=ppt/slides/slide15.xml><?xml version="1.0" encoding="utf-8"?>
+<p:sld xmlns:a="http://schemas.openxmlformats.org/drawingml/2006/main" xmlns:r="http://schemas.openxmlformats.org/officeDocument/2006/relationships" xmlns:p="http://schemas.openxmlformats.org/presentationml/2006/main">
+  <p:cSld>
+    <p:spTree>
+      <p:nvGrpSpPr>
+        <p:cNvPr id="1" name=""/>
+        <p:cNvGrpSpPr/>
+        <p:nvPr/>
+      </p:nvGrpSpPr>
+      <p:grpSpPr>
+        <a:xfrm>
+          <a:off x="0" y="0"/>
+          <a:ext cx="0" cy="0"/>
+          <a:chOff x="0" y="0"/>
+          <a:chExt cx="0" cy="0"/>
+        </a:xfrm>
+      </p:grpSpPr>
+      <p:sp>
+        <p:nvSpPr>
+          <p:cNvPr id="2" name="标题 1"/>
+          <p:cNvSpPr>
+            <a:spLocks noGrp="1"/>
+          </p:cNvSpPr>
+          <p:nvPr>
+            <p:ph type="ctrTitle"/>
+          </p:nvPr>
+        </p:nvSpPr>
+        <p:spPr>
+          <a:xfrm>
+            <a:off x="373626" y="309716"/>
+            <a:ext cx="7590503" cy="840658"/>
+          </a:xfrm>
+        </p:spPr>
+        <p:txBody>
+          <a:bodyPr>
+            <a:normAutofit/>
+          </a:bodyPr>
+          <a:lstStyle/>
+          <a:p>
+            <a:pPr algn="l"/>
+            <a:r>
+              <a:rPr lang="zh-CN" altLang="en-US" sz="5400" dirty="0"/>
+              <a:t>创建版本库</a:t>
+            </a:r>
+          </a:p>
+        </p:txBody>
+      </p:sp>
+      <p:sp>
+        <p:nvSpPr>
+          <p:cNvPr id="3" name="副标题 2"/>
+          <p:cNvSpPr>
+            <a:spLocks noGrp="1"/>
+          </p:cNvSpPr>
+          <p:nvPr>
+            <p:ph type="subTitle" idx="1"/>
+          </p:nvPr>
+        </p:nvSpPr>
+        <p:spPr>
+          <a:xfrm>
+            <a:off x="373626" y="1356851"/>
+            <a:ext cx="11336593" cy="1696065"/>
+          </a:xfrm>
+        </p:spPr>
+        <p:txBody>
+          <a:bodyPr>
+            <a:noAutofit/>
+          </a:bodyPr>
+          <a:lstStyle/>
+          <a:p>
+            <a:pPr algn="l">
+              <a:lnSpc>
+                <a:spcPct val="150000"/>
+              </a:lnSpc>
+            </a:pPr>
+            <a:r>
+              <a:rPr lang="zh-CN" altLang="en-US" sz="1600" dirty="0"/>
+              <a:t>瞬间</a:t>
+            </a:r>
+            <a:r>
+              <a:rPr lang="en-US" altLang="zh-CN" sz="1600" dirty="0" err="1"/>
+              <a:t>Git</a:t>
+            </a:r>
+            <a:r>
+              <a:rPr lang="zh-CN" altLang="en-US" sz="1600" dirty="0"/>
+              <a:t>就把仓库建好了，而且告诉你是一个空的仓库（</a:t>
+            </a:r>
+            <a:r>
+              <a:rPr lang="en-US" altLang="zh-CN" sz="1600" dirty="0"/>
+              <a:t>empty </a:t>
+            </a:r>
+            <a:r>
+              <a:rPr lang="en-US" altLang="zh-CN" sz="1600" dirty="0" err="1"/>
+              <a:t>Git</a:t>
+            </a:r>
+            <a:r>
+              <a:rPr lang="en-US" altLang="zh-CN" sz="1600" dirty="0"/>
+              <a:t> repository</a:t>
+            </a:r>
+            <a:r>
+              <a:rPr lang="zh-CN" altLang="en-US" sz="1600" dirty="0"/>
+              <a:t>），细心的读者可以发现当前目录下多了一个</a:t>
+            </a:r>
+            <a:r>
+              <a:rPr lang="en-US" altLang="zh-CN" sz="1600" dirty="0"/>
+              <a:t>.</a:t>
+            </a:r>
+            <a:r>
+              <a:rPr lang="en-US" altLang="zh-CN" sz="1600" dirty="0" err="1"/>
+              <a:t>git</a:t>
+            </a:r>
+            <a:r>
+              <a:rPr lang="zh-CN" altLang="en-US" sz="1600" dirty="0"/>
+              <a:t>的目录，这个目录是</a:t>
+            </a:r>
+            <a:r>
+              <a:rPr lang="en-US" altLang="zh-CN" sz="1600" dirty="0" err="1"/>
+              <a:t>Git</a:t>
+            </a:r>
+            <a:r>
+              <a:rPr lang="zh-CN" altLang="en-US" sz="1600" dirty="0"/>
+              <a:t>来跟踪管理版本库的，没事千万不要手动修改这个目录里面的文件，不然改乱了，就把</a:t>
+            </a:r>
+            <a:r>
+              <a:rPr lang="en-US" altLang="zh-CN" sz="1600" dirty="0" err="1"/>
+              <a:t>Git</a:t>
+            </a:r>
+            <a:r>
+              <a:rPr lang="zh-CN" altLang="en-US" sz="1600" dirty="0"/>
+              <a:t>仓库给破坏了。</a:t>
+            </a:r>
+          </a:p>
+          <a:p>
+            <a:pPr algn="l">
+              <a:lnSpc>
+                <a:spcPct val="150000"/>
+              </a:lnSpc>
+            </a:pPr>
+            <a:r>
+              <a:rPr lang="zh-CN" altLang="en-US" sz="1600" dirty="0"/>
+              <a:t>如果你没有看到</a:t>
+            </a:r>
+            <a:r>
+              <a:rPr lang="en-US" altLang="zh-CN" sz="1600" dirty="0"/>
+              <a:t>.</a:t>
+            </a:r>
+            <a:r>
+              <a:rPr lang="en-US" altLang="zh-CN" sz="1600" dirty="0" err="1"/>
+              <a:t>git</a:t>
+            </a:r>
+            <a:r>
+              <a:rPr lang="zh-CN" altLang="en-US" sz="1600" dirty="0"/>
+              <a:t>目录，那是因为这个目录默认是隐藏的，用</a:t>
+            </a:r>
+            <a:r>
+              <a:rPr lang="en-US" altLang="zh-CN" sz="1600" dirty="0" err="1"/>
+              <a:t>ls</a:t>
+            </a:r>
+            <a:r>
+              <a:rPr lang="en-US" altLang="zh-CN" sz="1600" dirty="0"/>
+              <a:t> -ah</a:t>
+            </a:r>
+            <a:r>
+              <a:rPr lang="zh-CN" altLang="en-US" sz="1600" dirty="0"/>
+              <a:t>命令就可以看见。</a:t>
+            </a:r>
+          </a:p>
+        </p:txBody>
+      </p:sp>
+      <p:pic>
+        <p:nvPicPr>
+          <p:cNvPr id="7" name="图片 6"/>
+          <p:cNvPicPr>
+            <a:picLocks noChangeAspect="1"/>
+          </p:cNvPicPr>
+          <p:nvPr/>
+        </p:nvPicPr>
+        <p:blipFill>
+          <a:blip r:embed="rId2"/>
+          <a:stretch>
+            <a:fillRect/>
+          </a:stretch>
+        </p:blipFill>
+        <p:spPr>
+          <a:xfrm>
+            <a:off x="403122" y="3259393"/>
+            <a:ext cx="4622800" cy="1066800"/>
+          </a:xfrm>
+          <a:prstGeom prst="rect">
+            <a:avLst/>
+          </a:prstGeom>
+        </p:spPr>
+      </p:pic>
+    </p:spTree>
+    <p:extLst>
+      <p:ext uri="{BB962C8B-B14F-4D97-AF65-F5344CB8AC3E}">
+        <p14:creationId xmlns:p14="http://schemas.microsoft.com/office/powerpoint/2010/main" val="246247255"/>
+      </p:ext>
+    </p:extLst>
+  </p:cSld>
+  <p:clrMapOvr>
+    <a:masterClrMapping/>
+  </p:clrMapOvr>
+</p:sld>
+</file>
+
+<file path=ppt/slides/slide16.xml><?xml version="1.0" encoding="utf-8"?>
+<p:sld xmlns:a="http://schemas.openxmlformats.org/drawingml/2006/main" xmlns:r="http://schemas.openxmlformats.org/officeDocument/2006/relationships" xmlns:p="http://schemas.openxmlformats.org/presentationml/2006/main">
+  <p:cSld>
+    <p:spTree>
+      <p:nvGrpSpPr>
+        <p:cNvPr id="1" name=""/>
+        <p:cNvGrpSpPr/>
+        <p:nvPr/>
+      </p:nvGrpSpPr>
+      <p:grpSpPr>
+        <a:xfrm>
+          <a:off x="0" y="0"/>
+          <a:ext cx="0" cy="0"/>
+          <a:chOff x="0" y="0"/>
+          <a:chExt cx="0" cy="0"/>
+        </a:xfrm>
+      </p:grpSpPr>
+      <p:sp>
+        <p:nvSpPr>
+          <p:cNvPr id="2" name="标题 1"/>
+          <p:cNvSpPr>
+            <a:spLocks noGrp="1"/>
+          </p:cNvSpPr>
+          <p:nvPr>
+            <p:ph type="ctrTitle"/>
+          </p:nvPr>
+        </p:nvSpPr>
+        <p:spPr>
+          <a:xfrm>
+            <a:off x="373626" y="309716"/>
+            <a:ext cx="7590503" cy="840658"/>
+          </a:xfrm>
+        </p:spPr>
+        <p:txBody>
+          <a:bodyPr>
+            <a:normAutofit/>
+          </a:bodyPr>
+          <a:lstStyle/>
+          <a:p>
+            <a:pPr algn="l"/>
+            <a:r>
+              <a:rPr lang="zh-CN" altLang="en-US" sz="5400" dirty="0"/>
+              <a:t>创建</a:t>
+            </a:r>
+            <a:r>
+              <a:rPr lang="zh-CN" altLang="en-US" sz="5400" dirty="0" smtClean="0"/>
+              <a:t>版本库</a:t>
+            </a:r>
+            <a:r>
+              <a:rPr lang="en-US" altLang="zh-CN" sz="5400" dirty="0" smtClean="0"/>
+              <a:t>--</a:t>
+            </a:r>
+            <a:r>
+              <a:rPr lang="zh-CN" altLang="en-US" sz="5400" dirty="0" smtClean="0"/>
+              <a:t>添加文件</a:t>
+            </a:r>
+            <a:endParaRPr lang="zh-CN" altLang="en-US" sz="5400" dirty="0"/>
+          </a:p>
+        </p:txBody>
+      </p:sp>
+      <p:sp>
+        <p:nvSpPr>
+          <p:cNvPr id="3" name="副标题 2"/>
+          <p:cNvSpPr>
+            <a:spLocks noGrp="1"/>
+          </p:cNvSpPr>
+          <p:nvPr>
+            <p:ph type="subTitle" idx="1"/>
+          </p:nvPr>
+        </p:nvSpPr>
+        <p:spPr>
+          <a:xfrm>
+            <a:off x="373626" y="1356852"/>
+            <a:ext cx="11336593" cy="958645"/>
+          </a:xfrm>
+        </p:spPr>
+        <p:txBody>
+          <a:bodyPr>
+            <a:noAutofit/>
+          </a:bodyPr>
+          <a:lstStyle/>
+          <a:p>
+            <a:pPr algn="l">
+              <a:lnSpc>
+                <a:spcPct val="150000"/>
+              </a:lnSpc>
+            </a:pPr>
+            <a:r>
+              <a:rPr lang="zh-CN" altLang="en-US" sz="1600" dirty="0"/>
+              <a:t>现在我们编写一个</a:t>
+            </a:r>
+            <a:r>
+              <a:rPr lang="en-US" altLang="zh-CN" sz="1600" dirty="0" err="1" smtClean="0"/>
+              <a:t>readme.txt</a:t>
+            </a:r>
+            <a:r>
+              <a:rPr lang="zh-CN" altLang="en-US" sz="1600" dirty="0"/>
+              <a:t>文件，内容如下</a:t>
+            </a:r>
+            <a:r>
+              <a:rPr lang="zh-CN" altLang="en-US" sz="1600" dirty="0" smtClean="0"/>
+              <a:t>：</a:t>
+            </a:r>
+          </a:p>
+          <a:p>
+            <a:pPr algn="l">
+              <a:lnSpc>
+                <a:spcPct val="150000"/>
+              </a:lnSpc>
+            </a:pPr>
+            <a:r>
+              <a:rPr lang="en-US" altLang="zh-CN" sz="1600" dirty="0" err="1" smtClean="0"/>
+              <a:t>Git</a:t>
+            </a:r>
+            <a:r>
+              <a:rPr lang="en-US" altLang="zh-CN" sz="1600" dirty="0" smtClean="0"/>
+              <a:t> </a:t>
+            </a:r>
+            <a:r>
+              <a:rPr lang="en-US" altLang="zh-CN" sz="1600" b="1" dirty="0"/>
+              <a:t>is</a:t>
+            </a:r>
+            <a:r>
+              <a:rPr lang="en-US" altLang="zh-CN" sz="1600" dirty="0" smtClean="0"/>
+              <a:t> a version control system. </a:t>
+            </a:r>
+            <a:r>
+              <a:rPr lang="en-US" altLang="zh-CN" sz="1600" dirty="0" err="1" smtClean="0"/>
+              <a:t>Git</a:t>
+            </a:r>
+            <a:r>
+              <a:rPr lang="en-US" altLang="zh-CN" sz="1600" dirty="0" smtClean="0"/>
+              <a:t> </a:t>
+            </a:r>
+            <a:r>
+              <a:rPr lang="en-US" altLang="zh-CN" sz="1600" b="1" dirty="0"/>
+              <a:t>is</a:t>
+            </a:r>
+            <a:r>
+              <a:rPr lang="en-US" altLang="zh-CN" sz="1600" dirty="0" smtClean="0"/>
+              <a:t> free software.</a:t>
+            </a:r>
+            <a:endParaRPr lang="zh-CN" altLang="en-US" sz="1600" dirty="0"/>
+          </a:p>
+        </p:txBody>
+      </p:sp>
+      <p:pic>
+        <p:nvPicPr>
+          <p:cNvPr id="4" name="图片 3"/>
+          <p:cNvPicPr>
+            <a:picLocks noChangeAspect="1"/>
+          </p:cNvPicPr>
+          <p:nvPr/>
+        </p:nvPicPr>
+        <p:blipFill>
+          <a:blip r:embed="rId2"/>
+          <a:stretch>
+            <a:fillRect/>
+          </a:stretch>
+        </p:blipFill>
+        <p:spPr>
+          <a:xfrm>
+            <a:off x="432618" y="2521975"/>
+            <a:ext cx="7124700" cy="3352800"/>
+          </a:xfrm>
+          <a:prstGeom prst="rect">
+            <a:avLst/>
+          </a:prstGeom>
+        </p:spPr>
+      </p:pic>
+    </p:spTree>
+    <p:extLst>
+      <p:ext uri="{BB962C8B-B14F-4D97-AF65-F5344CB8AC3E}">
+        <p14:creationId xmlns:p14="http://schemas.microsoft.com/office/powerpoint/2010/main" val="110613202"/>
+      </p:ext>
+    </p:extLst>
+  </p:cSld>
+  <p:clrMapOvr>
+    <a:masterClrMapping/>
+  </p:clrMapOvr>
+</p:sld>
+</file>
+
+<file path=ppt/slides/slide17.xml><?xml version="1.0" encoding="utf-8"?>
+<p:sld xmlns:a="http://schemas.openxmlformats.org/drawingml/2006/main" xmlns:r="http://schemas.openxmlformats.org/officeDocument/2006/relationships" xmlns:p="http://schemas.openxmlformats.org/presentationml/2006/main">
+  <p:cSld>
+    <p:spTree>
+      <p:nvGrpSpPr>
+        <p:cNvPr id="1" name=""/>
+        <p:cNvGrpSpPr/>
+        <p:nvPr/>
+      </p:nvGrpSpPr>
+      <p:grpSpPr>
+        <a:xfrm>
+          <a:off x="0" y="0"/>
+          <a:ext cx="0" cy="0"/>
+          <a:chOff x="0" y="0"/>
+          <a:chExt cx="0" cy="0"/>
+        </a:xfrm>
+      </p:grpSpPr>
+      <p:sp>
+        <p:nvSpPr>
+          <p:cNvPr id="2" name="标题 1"/>
+          <p:cNvSpPr>
+            <a:spLocks noGrp="1"/>
+          </p:cNvSpPr>
+          <p:nvPr>
+            <p:ph type="ctrTitle"/>
+          </p:nvPr>
+        </p:nvSpPr>
+        <p:spPr>
+          <a:xfrm>
+            <a:off x="373626" y="309716"/>
+            <a:ext cx="7590503" cy="840658"/>
+          </a:xfrm>
+        </p:spPr>
+        <p:txBody>
+          <a:bodyPr>
+            <a:normAutofit/>
+          </a:bodyPr>
+          <a:lstStyle/>
+          <a:p>
+            <a:pPr algn="l"/>
+            <a:r>
+              <a:rPr lang="zh-CN" altLang="en-US" sz="5400" dirty="0"/>
+              <a:t>创建</a:t>
+            </a:r>
+            <a:r>
+              <a:rPr lang="zh-CN" altLang="en-US" sz="5400" dirty="0" smtClean="0"/>
+              <a:t>版本库</a:t>
+            </a:r>
+            <a:r>
+              <a:rPr lang="en-US" altLang="zh-CN" sz="5400" dirty="0" smtClean="0"/>
+              <a:t>--</a:t>
+            </a:r>
+            <a:r>
+              <a:rPr lang="zh-CN" altLang="en-US" sz="5400" dirty="0" smtClean="0"/>
+              <a:t>添加文件</a:t>
+            </a:r>
+            <a:endParaRPr lang="zh-CN" altLang="en-US" sz="5400" dirty="0"/>
+          </a:p>
+        </p:txBody>
+      </p:sp>
+      <p:pic>
+        <p:nvPicPr>
+          <p:cNvPr id="6" name="图片 5"/>
+          <p:cNvPicPr>
+            <a:picLocks noChangeAspect="1"/>
+          </p:cNvPicPr>
+          <p:nvPr/>
+        </p:nvPicPr>
+        <p:blipFill>
+          <a:blip r:embed="rId2"/>
+          <a:stretch>
+            <a:fillRect/>
+          </a:stretch>
+        </p:blipFill>
+        <p:spPr>
+          <a:xfrm>
+            <a:off x="581127" y="1314245"/>
+            <a:ext cx="7175500" cy="2489200"/>
+          </a:xfrm>
+          <a:prstGeom prst="rect">
+            <a:avLst/>
+          </a:prstGeom>
+        </p:spPr>
+      </p:pic>
+      <p:pic>
+        <p:nvPicPr>
+          <p:cNvPr id="8" name="图片 7"/>
+          <p:cNvPicPr>
+            <a:picLocks noChangeAspect="1"/>
+          </p:cNvPicPr>
+          <p:nvPr/>
+        </p:nvPicPr>
+        <p:blipFill>
+          <a:blip r:embed="rId3"/>
+          <a:stretch>
+            <a:fillRect/>
+          </a:stretch>
+        </p:blipFill>
+        <p:spPr>
+          <a:xfrm>
+            <a:off x="581127" y="3967316"/>
+            <a:ext cx="4991100" cy="990600"/>
+          </a:xfrm>
+          <a:prstGeom prst="rect">
+            <a:avLst/>
+          </a:prstGeom>
+        </p:spPr>
+      </p:pic>
+      <p:sp>
+        <p:nvSpPr>
+          <p:cNvPr id="9" name="副标题 2"/>
+          <p:cNvSpPr>
+            <a:spLocks noGrp="1"/>
+          </p:cNvSpPr>
+          <p:nvPr>
+            <p:ph type="subTitle" idx="1"/>
+          </p:nvPr>
+        </p:nvSpPr>
+        <p:spPr>
+          <a:xfrm>
+            <a:off x="476865" y="5284018"/>
+            <a:ext cx="11336593" cy="1190523"/>
+          </a:xfrm>
+        </p:spPr>
+        <p:txBody>
+          <a:bodyPr>
+            <a:noAutofit/>
+          </a:bodyPr>
+          <a:lstStyle/>
+          <a:p>
+            <a:pPr algn="l">
+              <a:lnSpc>
+                <a:spcPct val="150000"/>
+              </a:lnSpc>
+            </a:pPr>
+            <a:r>
+              <a:rPr lang="zh-CN" altLang="en-US" sz="1600" dirty="0"/>
+              <a:t>简单解释一下</a:t>
+            </a:r>
+            <a:r>
+              <a:rPr lang="en-US" altLang="zh-CN" sz="1600" dirty="0" err="1" smtClean="0"/>
+              <a:t>git</a:t>
+            </a:r>
+            <a:r>
+              <a:rPr lang="en-US" altLang="zh-CN" sz="1600" dirty="0" smtClean="0"/>
+              <a:t> commit</a:t>
+            </a:r>
+            <a:r>
+              <a:rPr lang="zh-CN" altLang="en-US" sz="1600" dirty="0"/>
+              <a:t>命令，</a:t>
+            </a:r>
+            <a:r>
+              <a:rPr lang="en-US" altLang="zh-CN" sz="1600" dirty="0" smtClean="0"/>
+              <a:t>-m</a:t>
+            </a:r>
+            <a:r>
+              <a:rPr lang="zh-CN" altLang="en-US" sz="1600" dirty="0"/>
+              <a:t>后面输入的是本次提交的说明，可以输入任意内容，当然最好是有意义的，这样你就能从历史记录里方便地找到改动记录。</a:t>
+            </a:r>
+          </a:p>
+        </p:txBody>
+      </p:sp>
+    </p:spTree>
+    <p:extLst>
+      <p:ext uri="{BB962C8B-B14F-4D97-AF65-F5344CB8AC3E}">
+        <p14:creationId xmlns:p14="http://schemas.microsoft.com/office/powerpoint/2010/main" val="1415505363"/>
+      </p:ext>
+    </p:extLst>
+  </p:cSld>
+  <p:clrMapOvr>
+    <a:masterClrMapping/>
+  </p:clrMapOvr>
+</p:sld>
+</file>
+
 <file path=ppt/slides/slide2.xml><?xml version="1.0" encoding="utf-8"?>
 <p:sld xmlns:a="http://schemas.openxmlformats.org/drawingml/2006/main" xmlns:r="http://schemas.openxmlformats.org/officeDocument/2006/relationships" xmlns:p="http://schemas.openxmlformats.org/presentationml/2006/main">
   <p:cSld>

</xml_diff>